<commit_message>
Upload new lecture materials
</commit_message>
<xml_diff>
--- a/Lecture/Lect1-Syllabus_HTML.pptx
+++ b/Lecture/Lect1-Syllabus_HTML.pptx
@@ -24,8 +24,9 @@
     <p:sldId id="295" r:id="rId18"/>
     <p:sldId id="285" r:id="rId19"/>
     <p:sldId id="291" r:id="rId20"/>
-    <p:sldId id="296" r:id="rId21"/>
-    <p:sldId id="297" r:id="rId22"/>
+    <p:sldId id="298" r:id="rId21"/>
+    <p:sldId id="296" r:id="rId22"/>
+    <p:sldId id="297" r:id="rId23"/>
   </p:sldIdLst>
   <p:sldSz cx="12192000" cy="6858000"/>
   <p:notesSz cx="6858000" cy="9144000"/>
@@ -261,7 +262,7 @@
           <a:p>
             <a:fld id="{88B86BFB-14E0-416A-A3F7-2406F596F60B}" type="datetimeFigureOut">
               <a:rPr lang="en-US" smtClean="0"/>
-              <a:t>1/20/2020</a:t>
+              <a:t>2/27/2020</a:t>
             </a:fld>
             <a:endParaRPr lang="en-US"/>
           </a:p>
@@ -429,7 +430,7 @@
           <a:p>
             <a:fld id="{88B86BFB-14E0-416A-A3F7-2406F596F60B}" type="datetimeFigureOut">
               <a:rPr lang="en-US" smtClean="0"/>
-              <a:t>1/20/2020</a:t>
+              <a:t>2/27/2020</a:t>
             </a:fld>
             <a:endParaRPr lang="en-US"/>
           </a:p>
@@ -607,7 +608,7 @@
           <a:p>
             <a:fld id="{88B86BFB-14E0-416A-A3F7-2406F596F60B}" type="datetimeFigureOut">
               <a:rPr lang="en-US" smtClean="0"/>
-              <a:t>1/20/2020</a:t>
+              <a:t>2/27/2020</a:t>
             </a:fld>
             <a:endParaRPr lang="en-US"/>
           </a:p>
@@ -789,7 +790,7 @@
           <a:p>
             <a:fld id="{88B86BFB-14E0-416A-A3F7-2406F596F60B}" type="datetimeFigureOut">
               <a:rPr lang="en-US" smtClean="0"/>
-              <a:t>1/20/2020</a:t>
+              <a:t>2/27/2020</a:t>
             </a:fld>
             <a:endParaRPr lang="en-US"/>
           </a:p>
@@ -1034,7 +1035,7 @@
           <a:p>
             <a:fld id="{88B86BFB-14E0-416A-A3F7-2406F596F60B}" type="datetimeFigureOut">
               <a:rPr lang="en-US" smtClean="0"/>
-              <a:t>1/20/2020</a:t>
+              <a:t>2/27/2020</a:t>
             </a:fld>
             <a:endParaRPr lang="en-US"/>
           </a:p>
@@ -1263,7 +1264,7 @@
           <a:p>
             <a:fld id="{88B86BFB-14E0-416A-A3F7-2406F596F60B}" type="datetimeFigureOut">
               <a:rPr lang="en-US" smtClean="0"/>
-              <a:t>1/20/2020</a:t>
+              <a:t>2/27/2020</a:t>
             </a:fld>
             <a:endParaRPr lang="en-US"/>
           </a:p>
@@ -1627,7 +1628,7 @@
           <a:p>
             <a:fld id="{88B86BFB-14E0-416A-A3F7-2406F596F60B}" type="datetimeFigureOut">
               <a:rPr lang="en-US" smtClean="0"/>
-              <a:t>1/20/2020</a:t>
+              <a:t>2/27/2020</a:t>
             </a:fld>
             <a:endParaRPr lang="en-US"/>
           </a:p>
@@ -1744,7 +1745,7 @@
           <a:p>
             <a:fld id="{88B86BFB-14E0-416A-A3F7-2406F596F60B}" type="datetimeFigureOut">
               <a:rPr lang="en-US" smtClean="0"/>
-              <a:t>1/20/2020</a:t>
+              <a:t>2/27/2020</a:t>
             </a:fld>
             <a:endParaRPr lang="en-US"/>
           </a:p>
@@ -1839,7 +1840,7 @@
           <a:p>
             <a:fld id="{88B86BFB-14E0-416A-A3F7-2406F596F60B}" type="datetimeFigureOut">
               <a:rPr lang="en-US" smtClean="0"/>
-              <a:t>1/20/2020</a:t>
+              <a:t>2/27/2020</a:t>
             </a:fld>
             <a:endParaRPr lang="en-US"/>
           </a:p>
@@ -2114,7 +2115,7 @@
           <a:p>
             <a:fld id="{88B86BFB-14E0-416A-A3F7-2406F596F60B}" type="datetimeFigureOut">
               <a:rPr lang="en-US" smtClean="0"/>
-              <a:t>1/20/2020</a:t>
+              <a:t>2/27/2020</a:t>
             </a:fld>
             <a:endParaRPr lang="en-US"/>
           </a:p>
@@ -2366,7 +2367,7 @@
           <a:p>
             <a:fld id="{88B86BFB-14E0-416A-A3F7-2406F596F60B}" type="datetimeFigureOut">
               <a:rPr lang="en-US" smtClean="0"/>
-              <a:t>1/20/2020</a:t>
+              <a:t>2/27/2020</a:t>
             </a:fld>
             <a:endParaRPr lang="en-US"/>
           </a:p>
@@ -2577,7 +2578,7 @@
           <a:p>
             <a:fld id="{88B86BFB-14E0-416A-A3F7-2406F596F60B}" type="datetimeFigureOut">
               <a:rPr lang="en-US" smtClean="0"/>
-              <a:t>1/20/2020</a:t>
+              <a:t>2/27/2020</a:t>
             </a:fld>
             <a:endParaRPr lang="en-US"/>
           </a:p>
@@ -9085,6 +9086,83 @@
           <a:chExt cx="0" cy="0"/>
         </a:xfrm>
       </p:grpSpPr>
+      <p:pic>
+        <p:nvPicPr>
+          <p:cNvPr id="2050" name="Picture 2" descr="Key differences between HTML &amp; CSS Have a big network of executives and HR managers? Introduce us to them and we will pay for your travel. Email me at carlos@recruitingforgood.com">
+            <a:extLst>
+              <a:ext uri="{FF2B5EF4-FFF2-40B4-BE49-F238E27FC236}">
+                <a16:creationId xmlns:a16="http://schemas.microsoft.com/office/drawing/2014/main" id="{79142F41-70AF-413E-B96F-179B626FAE1B}"/>
+              </a:ext>
+            </a:extLst>
+          </p:cNvPr>
+          <p:cNvPicPr>
+            <a:picLocks noChangeAspect="1" noChangeArrowheads="1"/>
+          </p:cNvPicPr>
+          <p:nvPr/>
+        </p:nvPicPr>
+        <p:blipFill>
+          <a:blip r:embed="rId2">
+            <a:extLst>
+              <a:ext uri="{28A0092B-C50C-407E-A947-70E740481C1C}">
+                <a14:useLocalDpi xmlns:a14="http://schemas.microsoft.com/office/drawing/2010/main" val="0"/>
+              </a:ext>
+            </a:extLst>
+          </a:blip>
+          <a:srcRect/>
+          <a:stretch>
+            <a:fillRect/>
+          </a:stretch>
+        </p:blipFill>
+        <p:spPr bwMode="auto">
+          <a:xfrm>
+            <a:off x="1218579" y="0"/>
+            <a:ext cx="2332037" cy="6858000"/>
+          </a:xfrm>
+          <a:prstGeom prst="rect">
+            <a:avLst/>
+          </a:prstGeom>
+          <a:noFill/>
+          <a:extLst>
+            <a:ext uri="{909E8E84-426E-40DD-AFC4-6F175D3DCCD1}">
+              <a14:hiddenFill xmlns:a14="http://schemas.microsoft.com/office/drawing/2010/main">
+                <a:solidFill>
+                  <a:srgbClr val="FFFFFF"/>
+                </a:solidFill>
+              </a14:hiddenFill>
+            </a:ext>
+          </a:extLst>
+        </p:spPr>
+      </p:pic>
+    </p:spTree>
+    <p:extLst>
+      <p:ext uri="{BB962C8B-B14F-4D97-AF65-F5344CB8AC3E}">
+        <p14:creationId xmlns:p14="http://schemas.microsoft.com/office/powerpoint/2010/main" val="1638668812"/>
+      </p:ext>
+    </p:extLst>
+  </p:cSld>
+  <p:clrMapOvr>
+    <a:masterClrMapping/>
+  </p:clrMapOvr>
+</p:sld>
+</file>
+
+<file path=ppt/slides/slide21.xml><?xml version="1.0" encoding="utf-8"?>
+<p:sld xmlns:a="http://schemas.openxmlformats.org/drawingml/2006/main" xmlns:r="http://schemas.openxmlformats.org/officeDocument/2006/relationships" xmlns:p="http://schemas.openxmlformats.org/presentationml/2006/main">
+  <p:cSld>
+    <p:spTree>
+      <p:nvGrpSpPr>
+        <p:cNvPr id="1" name=""/>
+        <p:cNvGrpSpPr/>
+        <p:nvPr/>
+      </p:nvGrpSpPr>
+      <p:grpSpPr>
+        <a:xfrm>
+          <a:off x="0" y="0"/>
+          <a:ext cx="0" cy="0"/>
+          <a:chOff x="0" y="0"/>
+          <a:chExt cx="0" cy="0"/>
+        </a:xfrm>
+      </p:grpSpPr>
       <p:sp>
         <p:nvSpPr>
           <p:cNvPr id="2" name="Title 1"/>
@@ -9412,7 +9490,7 @@
 </p:sld>
 </file>
 
-<file path=ppt/slides/slide21.xml><?xml version="1.0" encoding="utf-8"?>
+<file path=ppt/slides/slide22.xml><?xml version="1.0" encoding="utf-8"?>
 <p:sld xmlns:a="http://schemas.openxmlformats.org/drawingml/2006/main" xmlns:r="http://schemas.openxmlformats.org/officeDocument/2006/relationships" xmlns:p="http://schemas.openxmlformats.org/presentationml/2006/main">
   <p:cSld>
     <p:spTree>

</xml_diff>